<commit_message>
revisions to powerpoint, adding links"
</commit_message>
<xml_diff>
--- a/fusion_tables_beyond_maps.pptx
+++ b/fusion_tables_beyond_maps.pptx
@@ -16,8 +16,8 @@
     <p:sldId id="267" r:id="rId4"/>
     <p:sldId id="276" r:id="rId5"/>
     <p:sldId id="278" r:id="rId6"/>
-    <p:sldId id="281" r:id="rId7"/>
-    <p:sldId id="283" r:id="rId8"/>
+    <p:sldId id="283" r:id="rId7"/>
+    <p:sldId id="298" r:id="rId8"/>
     <p:sldId id="293" r:id="rId9"/>
     <p:sldId id="297" r:id="rId10"/>
     <p:sldId id="296" r:id="rId11"/>
@@ -258,7 +258,7 @@
             <a:fld id="{4710CF3B-AF89-4F13-9761-A0E748D6542C}" type="datetime1">
               <a:rPr lang="en-US"/>
               <a:pPr/>
-              <a:t>2/28/13</a:t>
+              <a:t>3/2/13</a:t>
             </a:fld>
             <a:endParaRPr lang="en-US"/>
           </a:p>
@@ -457,7 +457,7 @@
             <a:fld id="{EDA65449-1216-46EF-8D49-3D053F836536}" type="datetime1">
               <a:rPr lang="en-US"/>
               <a:pPr/>
-              <a:t>2/28/13</a:t>
+              <a:t>3/2/13</a:t>
             </a:fld>
             <a:endParaRPr lang="en-US"/>
           </a:p>
@@ -4218,17 +4218,8 @@
               <a:rPr lang="en-US" dirty="0" smtClean="0">
                 <a:latin typeface="Futura Condensed" charset="0"/>
               </a:rPr>
-              <a:t>Fusion </a:t>
-            </a:r>
-            <a:r>
-              <a:rPr lang="en-US" dirty="0" smtClean="0">
-                <a:latin typeface="Futura Condensed" charset="0"/>
-              </a:rPr>
-              <a:t>Tables: Beyond the Map</a:t>
-            </a:r>
-            <a:endParaRPr lang="en-US" dirty="0" smtClean="0">
-              <a:latin typeface="Futura Condensed" charset="0"/>
-            </a:endParaRPr>
+              <a:t>Fusion Tables: Beyond the Map</a:t>
+            </a:r>
           </a:p>
         </p:txBody>
       </p:sp>
@@ -4266,37 +4257,7 @@
               <a:rPr lang="en-US" dirty="0" smtClean="0">
                 <a:ea typeface="+mn-ea"/>
               </a:rPr>
-              <a:t>NICAR</a:t>
-            </a:r>
-            <a:r>
-              <a:rPr lang="en-US" dirty="0" smtClean="0">
-                <a:ea typeface="+mn-ea"/>
-              </a:rPr>
-              <a:t> 2013, Louisville, Ky. </a:t>
-            </a:r>
-            <a:r>
-              <a:rPr lang="en-US" dirty="0" smtClean="0">
-                <a:ea typeface="+mn-ea"/>
-              </a:rPr>
-              <a:t>3</a:t>
-            </a:r>
-            <a:r>
-              <a:rPr lang="en-US" dirty="0" smtClean="0">
-                <a:ea typeface="+mn-ea"/>
-              </a:rPr>
-              <a:t>/</a:t>
-            </a:r>
-            <a:r>
-              <a:rPr lang="en-US" dirty="0" smtClean="0">
-                <a:ea typeface="+mn-ea"/>
-              </a:rPr>
-              <a:t>2</a:t>
-            </a:r>
-            <a:r>
-              <a:rPr lang="en-US" dirty="0" smtClean="0">
-                <a:ea typeface="+mn-ea"/>
-              </a:rPr>
-              <a:t>/2013</a:t>
+              <a:t>NICAR 2013, Louisville, Ky. 3/2/2013</a:t>
             </a:r>
           </a:p>
           <a:p>
@@ -4817,19 +4778,8 @@
                 <a:latin typeface="Futura Condensed"/>
                 <a:cs typeface="Futura Condensed"/>
               </a:rPr>
-              <a:t>developers.google.com</a:t>
-            </a:r>
-            <a:r>
-              <a:rPr lang="en-US" sz="2400" b="1" dirty="0" smtClean="0">
-                <a:latin typeface="Futura Condensed"/>
-                <a:cs typeface="Futura Condensed"/>
-              </a:rPr>
-              <a:t>/fusiontables/docs/v1/sql-reference</a:t>
-            </a:r>
-            <a:endParaRPr lang="en-US" sz="2400" b="1" dirty="0" smtClean="0">
-              <a:latin typeface="Futura Condensed"/>
-              <a:cs typeface="Futura Condensed"/>
-            </a:endParaRPr>
+              <a:t>developers.google.com/fusiontables/docs/v1/sql-reference</a:t>
+            </a:r>
           </a:p>
         </p:txBody>
       </p:sp>
@@ -4948,10 +4898,6 @@
               </a:rPr>
               <a:t>-fusion</a:t>
             </a:r>
-            <a:endParaRPr lang="en-US" sz="2400" b="1" dirty="0" smtClean="0">
-              <a:latin typeface="Futura Condensed"/>
-              <a:cs typeface="Futura Condensed"/>
-            </a:endParaRPr>
           </a:p>
         </p:txBody>
       </p:sp>
@@ -5124,23 +5070,8 @@
               <a:rPr lang="en-US" dirty="0" smtClean="0">
                 <a:latin typeface="Futura Condensed" charset="0"/>
               </a:rPr>
-              <a:t>The m</a:t>
-            </a:r>
-            <a:r>
-              <a:rPr lang="en-US" dirty="0" smtClean="0">
-                <a:latin typeface="Futura Condensed" charset="0"/>
-              </a:rPr>
-              <a:t>aps rock, but </a:t>
-            </a:r>
-            <a:r>
-              <a:rPr lang="en-US" dirty="0" smtClean="0">
-                <a:latin typeface="Futura Condensed" charset="0"/>
-              </a:rPr>
-              <a:t>can I do something else with it?</a:t>
-            </a:r>
-            <a:endParaRPr lang="en-US" dirty="0" smtClean="0">
-              <a:latin typeface="Futura Condensed" charset="0"/>
-            </a:endParaRPr>
+              <a:t>The maps rock, but can I do something else with it?</a:t>
+            </a:r>
           </a:p>
         </p:txBody>
       </p:sp>
@@ -5229,51 +5160,26 @@
           <a:p>
             <a:r>
               <a:rPr lang="en-US" dirty="0" smtClean="0"/>
-              <a:t>First c</a:t>
-            </a:r>
+              <a:t>First convert to CSV or Excel</a:t>
+            </a:r>
+          </a:p>
+          <a:p>
             <a:r>
               <a:rPr lang="en-US" dirty="0" smtClean="0"/>
-              <a:t>onvert to CSV or Excel</a:t>
-            </a:r>
-          </a:p>
-          <a:p>
-            <a:r>
-              <a:rPr lang="en-US" dirty="0" smtClean="0"/>
-              <a:t>First make it a Google </a:t>
-            </a:r>
-            <a:r>
-              <a:rPr lang="en-US" dirty="0" smtClean="0"/>
-              <a:t>Documents </a:t>
-            </a:r>
-            <a:r>
-              <a:rPr lang="en-US" dirty="0" smtClean="0"/>
-              <a:t>Spreadsheet</a:t>
+              <a:t>First make it a Google Documents Spreadsheet</a:t>
             </a:r>
             <a:br>
               <a:rPr lang="en-US" dirty="0" smtClean="0"/>
             </a:br>
             <a:r>
               <a:rPr lang="en-US" dirty="0" smtClean="0"/>
-              <a:t>(super cool </a:t>
-            </a:r>
+              <a:t>(super cool intermediate step)</a:t>
+            </a:r>
+          </a:p>
+          <a:p>
             <a:r>
               <a:rPr lang="en-US" dirty="0" smtClean="0"/>
-              <a:t>intermediate step)</a:t>
-            </a:r>
-            <a:endParaRPr lang="en-US" dirty="0" smtClean="0"/>
-          </a:p>
-          <a:p>
-            <a:r>
-              <a:rPr lang="en-US" dirty="0" smtClean="0"/>
-              <a:t>Is there a KML file </a:t>
-            </a:r>
-            <a:r>
-              <a:rPr lang="en-US" dirty="0" smtClean="0"/>
-              <a:t>(Google Maps/Google Earth file</a:t>
-            </a:r>
-            <a:r>
-              <a:rPr lang="en-US" dirty="0" smtClean="0"/>
-              <a:t>)?</a:t>
+              <a:t>Is there a KML file (Google Maps/Google Earth file)?</a:t>
             </a:r>
           </a:p>
           <a:p>
@@ -5350,7 +5256,9 @@
       </p:sp>
       <p:pic>
         <p:nvPicPr>
-          <p:cNvPr id="6" name="Content Placeholder 5" descr="Screen shot 2013-02-28 at 2.24.23 PM.png"/>
+          <p:cNvPr id="6" name="Content Placeholder 5" descr="Screen shot 2013-02-28 at 2.24.23 PM.png">
+            <a:hlinkClick r:id="rId2"/>
+          </p:cNvPr>
           <p:cNvPicPr>
             <a:picLocks noGrp="1" noChangeAspect="1"/>
           </p:cNvPicPr>
@@ -5359,7 +5267,7 @@
           </p:nvPr>
         </p:nvPicPr>
         <p:blipFill>
-          <a:blip r:embed="rId2"/>
+          <a:blip r:embed="rId3"/>
           <a:srcRect l="-25996" r="-25996"/>
           <a:stretch>
             <a:fillRect/>
@@ -5464,7 +5372,7 @@
 </file>
 
 <file path=ppt/slides/slide6.xml><?xml version="1.0" encoding="utf-8"?>
-<p:sld xmlns:a="http://schemas.openxmlformats.org/drawingml/2006/main" xmlns:r="http://schemas.openxmlformats.org/officeDocument/2006/relationships" xmlns:mc="http://schemas.openxmlformats.org/markup-compatibility/2006" xmlns:mv="urn:schemas-microsoft-com:mac:vml" xmlns:p="http://schemas.openxmlformats.org/presentationml/2006/main" mc:Ignorable="mv" mc:PreserveAttributes="mv:*" show="0">
+<p:sld xmlns:a="http://schemas.openxmlformats.org/drawingml/2006/main" xmlns:r="http://schemas.openxmlformats.org/officeDocument/2006/relationships" xmlns:mc="http://schemas.openxmlformats.org/markup-compatibility/2006" xmlns:mv="urn:schemas-microsoft-com:mac:vml" xmlns:p="http://schemas.openxmlformats.org/presentationml/2006/main" mc:Ignorable="mv" mc:PreserveAttributes="mv:*">
   <p:cSld>
     <p:spTree>
       <p:nvGrpSpPr>
@@ -5498,37 +5406,43 @@
             <a:pPr algn="l"/>
             <a:r>
               <a:rPr lang="en-US" dirty="0" smtClean="0"/>
-              <a:t>Networks in your data …</a:t>
+              <a:t>Also for DIY Networks …</a:t>
             </a:r>
             <a:endParaRPr lang="en-US" dirty="0"/>
           </a:p>
         </p:txBody>
       </p:sp>
-      <p:sp>
-        <p:nvSpPr>
-          <p:cNvPr id="4" name="Content Placeholder 3"/>
-          <p:cNvSpPr>
-            <a:spLocks noGrp="1"/>
-          </p:cNvSpPr>
+      <p:pic>
+        <p:nvPicPr>
+          <p:cNvPr id="5" name="Content Placeholder 4" descr="Screen shot 2013-02-28 at 2.34.47 PM.png">
+            <a:hlinkClick r:id="rId2"/>
+          </p:cNvPr>
+          <p:cNvPicPr>
+            <a:picLocks noGrp="1" noChangeAspect="1"/>
+          </p:cNvPicPr>
           <p:nvPr>
             <p:ph idx="1"/>
           </p:nvPr>
-        </p:nvSpPr>
-        <p:spPr/>
-        <p:txBody>
-          <a:bodyPr/>
-          <a:lstStyle/>
-          <a:p>
-            <a:endParaRPr lang="en-US"/>
-          </a:p>
-        </p:txBody>
-      </p:sp>
+        </p:nvPicPr>
+        <p:blipFill>
+          <a:blip r:embed="rId3"/>
+          <a:srcRect t="-2661" b="-2661"/>
+          <a:stretch>
+            <a:fillRect/>
+          </a:stretch>
+        </p:blipFill>
+        <p:spPr>
+          <a:xfrm>
+            <a:off x="879006" y="1978400"/>
+            <a:ext cx="7243822" cy="3983823"/>
+          </a:xfrm>
+        </p:spPr>
+      </p:pic>
     </p:spTree>
   </p:cSld>
   <p:clrMapOvr>
     <a:masterClrMapping/>
   </p:clrMapOvr>
-  <p:transition/>
 </p:sld>
 </file>
 
@@ -5575,50 +5489,28 @@
       </p:sp>
       <p:pic>
         <p:nvPicPr>
-          <p:cNvPr id="8" name="Picture 7" descr="Screen shot 2013-02-28 at 2.38.33 PM.png"/>
+          <p:cNvPr id="4" name="Picture 3" descr="Screen shot 2013-02-28 at 2.38.33 PM.png">
+            <a:hlinkClick r:id="rId2"/>
+          </p:cNvPr>
           <p:cNvPicPr>
             <a:picLocks noChangeAspect="1"/>
           </p:cNvPicPr>
           <p:nvPr/>
         </p:nvPicPr>
         <p:blipFill>
-          <a:blip r:embed="rId2"/>
+          <a:blip r:embed="rId3"/>
           <a:stretch>
             <a:fillRect/>
           </a:stretch>
         </p:blipFill>
         <p:spPr>
           <a:xfrm>
-            <a:off x="3164049" y="1561887"/>
-            <a:ext cx="5522751" cy="3572530"/>
+            <a:off x="656923" y="1504151"/>
+            <a:ext cx="7606697" cy="4920583"/>
           </a:xfrm>
           <a:prstGeom prst="rect">
             <a:avLst/>
           </a:prstGeom>
-        </p:spPr>
-      </p:pic>
-      <p:pic>
-        <p:nvPicPr>
-          <p:cNvPr id="5" name="Content Placeholder 4" descr="Screen shot 2013-02-28 at 2.34.47 PM.png"/>
-          <p:cNvPicPr>
-            <a:picLocks noGrp="1" noChangeAspect="1"/>
-          </p:cNvPicPr>
-          <p:nvPr>
-            <p:ph idx="1"/>
-          </p:nvPr>
-        </p:nvPicPr>
-        <p:blipFill>
-          <a:blip r:embed="rId3"/>
-          <a:srcRect t="-2661" b="-2661"/>
-          <a:stretch>
-            <a:fillRect/>
-          </a:stretch>
-        </p:blipFill>
-        <p:spPr>
-          <a:xfrm>
-            <a:off x="160305" y="4552451"/>
-            <a:ext cx="3613031" cy="1987028"/>
-          </a:xfrm>
         </p:spPr>
       </p:pic>
     </p:spTree>
@@ -5704,7 +5596,6 @@
               <a:rPr lang="en-US" dirty="0" smtClean="0"/>
               <a:t>Remember FEC data? </a:t>
             </a:r>
-            <a:endParaRPr lang="en-US" dirty="0" smtClean="0"/>
           </a:p>
           <a:p>
             <a:pPr indent="0">

</xml_diff>

<commit_message>
ppt version just before class starts
</commit_message>
<xml_diff>
--- a/fusion_tables_beyond_maps.pptx
+++ b/fusion_tables_beyond_maps.pptx
@@ -5,10 +5,10 @@
     <p:sldMasterId id="2147483648" r:id="rId1"/>
   </p:sldMasterIdLst>
   <p:notesMasterIdLst>
-    <p:notesMasterId r:id="rId17"/>
+    <p:notesMasterId r:id="rId19"/>
   </p:notesMasterIdLst>
   <p:handoutMasterIdLst>
-    <p:handoutMasterId r:id="rId18"/>
+    <p:handoutMasterId r:id="rId20"/>
   </p:handoutMasterIdLst>
   <p:sldIdLst>
     <p:sldId id="256" r:id="rId2"/>
@@ -20,12 +20,14 @@
     <p:sldId id="298" r:id="rId8"/>
     <p:sldId id="293" r:id="rId9"/>
     <p:sldId id="297" r:id="rId10"/>
-    <p:sldId id="296" r:id="rId11"/>
-    <p:sldId id="294" r:id="rId12"/>
-    <p:sldId id="285" r:id="rId13"/>
-    <p:sldId id="295" r:id="rId14"/>
-    <p:sldId id="284" r:id="rId15"/>
-    <p:sldId id="263" r:id="rId16"/>
+    <p:sldId id="299" r:id="rId11"/>
+    <p:sldId id="300" r:id="rId12"/>
+    <p:sldId id="296" r:id="rId13"/>
+    <p:sldId id="294" r:id="rId14"/>
+    <p:sldId id="285" r:id="rId15"/>
+    <p:sldId id="295" r:id="rId16"/>
+    <p:sldId id="284" r:id="rId17"/>
+    <p:sldId id="263" r:id="rId18"/>
   </p:sldIdLst>
   <p:sldSz cx="9144000" cy="6858000" type="screen4x3"/>
   <p:notesSz cx="6858000" cy="9144000"/>
@@ -4409,76 +4411,27 @@
           </a:p>
         </p:txBody>
       </p:sp>
-      <p:sp>
-        <p:nvSpPr>
-          <p:cNvPr id="3" name="Content Placeholder 2"/>
-          <p:cNvSpPr>
-            <a:spLocks noGrp="1"/>
-          </p:cNvSpPr>
+      <p:pic>
+        <p:nvPicPr>
+          <p:cNvPr id="8" name="Content Placeholder 7" descr="Screen shot 2013-03-02 at 8.46.32 AM.png">
+            <a:hlinkClick r:id="rId2"/>
+          </p:cNvPr>
+          <p:cNvPicPr>
+            <a:picLocks noGrp="1" noChangeAspect="1"/>
+          </p:cNvPicPr>
           <p:nvPr>
             <p:ph idx="1"/>
           </p:nvPr>
-        </p:nvSpPr>
+        </p:nvPicPr>
+        <p:blipFill>
+          <a:blip r:embed="rId3"/>
+          <a:srcRect l="-18097" r="-18097"/>
+          <a:stretch>
+            <a:fillRect/>
+          </a:stretch>
+        </p:blipFill>
         <p:spPr/>
-        <p:txBody>
-          <a:bodyPr/>
-          <a:lstStyle/>
-          <a:p>
-            <a:pPr indent="0">
-              <a:buNone/>
-            </a:pPr>
-            <a:r>
-              <a:rPr lang="en-US" dirty="0" smtClean="0"/>
-              <a:t>Is there a shared key in one field?  If not,  you must create it before you import the file.</a:t>
-            </a:r>
-          </a:p>
-          <a:p>
-            <a:pPr indent="0">
-              <a:buNone/>
-            </a:pPr>
-            <a:r>
-              <a:rPr lang="en-US" dirty="0" smtClean="0"/>
-              <a:t/>
-            </a:r>
-            <a:br>
-              <a:rPr lang="en-US" dirty="0" smtClean="0"/>
-            </a:br>
-            <a:r>
-              <a:rPr lang="en-US" dirty="0" smtClean="0"/>
-              <a:t>But be careful or Daniel Lathrop == </a:t>
-            </a:r>
-            <a:r>
-              <a:rPr lang="en-US" dirty="0" err="1" smtClean="0"/>
-              <a:t>Daniella</a:t>
-            </a:r>
-            <a:r>
-              <a:rPr lang="en-US" dirty="0" smtClean="0"/>
-              <a:t> </a:t>
-            </a:r>
-            <a:r>
-              <a:rPr lang="en-US" dirty="0" err="1" smtClean="0"/>
-              <a:t>Throp</a:t>
-            </a:r>
-            <a:endParaRPr lang="en-US" dirty="0" smtClean="0"/>
-          </a:p>
-          <a:p>
-            <a:pPr indent="0">
-              <a:buNone/>
-            </a:pPr>
-            <a:r>
-              <a:rPr lang="en-US" dirty="0" smtClean="0"/>
-              <a:t/>
-            </a:r>
-            <a:br>
-              <a:rPr lang="en-US" dirty="0" smtClean="0"/>
-            </a:br>
-            <a:r>
-              <a:rPr lang="en-US" dirty="0" smtClean="0"/>
-              <a:t>So use | (pipes) or  / or . or : or etc. (but never commas)</a:t>
-            </a:r>
-          </a:p>
-        </p:txBody>
-      </p:sp>
+      </p:pic>
     </p:spTree>
   </p:cSld>
   <p:clrMapOvr>
@@ -4488,7 +4441,7 @@
 </file>
 
 <file path=ppt/slides/slide11.xml><?xml version="1.0" encoding="utf-8"?>
-<p:sld xmlns:a="http://schemas.openxmlformats.org/drawingml/2006/main" xmlns:r="http://schemas.openxmlformats.org/officeDocument/2006/relationships" xmlns:mc="http://schemas.openxmlformats.org/markup-compatibility/2006" xmlns:mv="urn:schemas-microsoft-com:mac:vml" xmlns:p="http://schemas.openxmlformats.org/presentationml/2006/main" mc:Ignorable="mv" mc:PreserveAttributes="mv:*">
+<p:sld xmlns:a="http://schemas.openxmlformats.org/drawingml/2006/main" xmlns:r="http://schemas.openxmlformats.org/officeDocument/2006/relationships" xmlns:mc="http://schemas.openxmlformats.org/markup-compatibility/2006" xmlns:mv="urn:schemas-microsoft-com:mac:vml" xmlns:p="http://schemas.openxmlformats.org/presentationml/2006/main" mc:Ignorable="mv" mc:PreserveAttributes="mv:*" show="0">
   <p:cSld>
     <p:spTree>
       <p:nvGrpSpPr>
@@ -4506,6 +4459,30 @@
       </p:grpSpPr>
       <p:sp>
         <p:nvSpPr>
+          <p:cNvPr id="2" name="Title 1"/>
+          <p:cNvSpPr>
+            <a:spLocks noGrp="1"/>
+          </p:cNvSpPr>
+          <p:nvPr>
+            <p:ph type="title"/>
+          </p:nvPr>
+        </p:nvSpPr>
+        <p:spPr/>
+        <p:txBody>
+          <a:bodyPr/>
+          <a:lstStyle/>
+          <a:p>
+            <a:pPr algn="l"/>
+            <a:r>
+              <a:rPr lang="en-US" dirty="0" smtClean="0"/>
+              <a:t>Join replacement surgery</a:t>
+            </a:r>
+            <a:endParaRPr lang="en-US" dirty="0"/>
+          </a:p>
+        </p:txBody>
+      </p:sp>
+      <p:sp>
+        <p:nvSpPr>
           <p:cNvPr id="3" name="Content Placeholder 2"/>
           <p:cNvSpPr>
             <a:spLocks noGrp="1"/>
@@ -4514,51 +4491,12 @@
             <p:ph idx="1"/>
           </p:nvPr>
         </p:nvSpPr>
-        <p:spPr>
-          <a:xfrm>
-            <a:off x="457200" y="610241"/>
-            <a:ext cx="8229600" cy="5515922"/>
-          </a:xfrm>
-        </p:spPr>
+        <p:spPr/>
         <p:txBody>
           <a:bodyPr/>
           <a:lstStyle/>
           <a:p>
-            <a:pPr indent="0">
-              <a:buNone/>
-            </a:pPr>
-            <a:r>
-              <a:rPr lang="en-US" dirty="0" smtClean="0"/>
-              <a:t>Suddenly you can find out who got money from whom, in your Web browser. More importantly, so can your colleagues.</a:t>
-            </a:r>
-          </a:p>
-          <a:p>
-            <a:pPr indent="0">
-              <a:buNone/>
-            </a:pPr>
-            <a:endParaRPr lang="en-US" dirty="0" smtClean="0"/>
-          </a:p>
-          <a:p>
-            <a:pPr indent="0">
-              <a:buNone/>
-            </a:pPr>
-            <a:r>
-              <a:rPr lang="en-US" strike="sngStrike" dirty="0" smtClean="0"/>
-              <a:t>SELECT * FROM INDV INNER JOIN CMTES ON CMTEID = CMTEID;</a:t>
-            </a:r>
-          </a:p>
-          <a:p>
-            <a:pPr indent="0">
-              <a:buNone/>
-            </a:pPr>
-            <a:r>
-              <a:rPr lang="en-US" dirty="0" smtClean="0"/>
-              <a:t/>
-            </a:r>
-            <a:br>
-              <a:rPr lang="en-US" dirty="0" smtClean="0"/>
-            </a:br>
-            <a:endParaRPr lang="en-US" dirty="0" smtClean="0"/>
+            <a:endParaRPr lang="en-US"/>
           </a:p>
         </p:txBody>
       </p:sp>
@@ -4567,6 +4505,7 @@
   <p:clrMapOvr>
     <a:masterClrMapping/>
   </p:clrMapOvr>
+  <p:transition/>
 </p:sld>
 </file>
 
@@ -4605,7 +4544,7 @@
             <a:pPr algn="l"/>
             <a:r>
               <a:rPr lang="en-US" dirty="0" smtClean="0"/>
-              <a:t>Use it with other Google tools</a:t>
+              <a:t>Join replacement surgery</a:t>
             </a:r>
             <a:endParaRPr lang="en-US" dirty="0"/>
           </a:p>
@@ -4613,7 +4552,7 @@
       </p:sp>
       <p:sp>
         <p:nvSpPr>
-          <p:cNvPr id="4" name="Content Placeholder 3"/>
+          <p:cNvPr id="3" name="Content Placeholder 2"/>
           <p:cNvSpPr>
             <a:spLocks noGrp="1"/>
           </p:cNvSpPr>
@@ -4626,34 +4565,58 @@
           <a:bodyPr/>
           <a:lstStyle/>
           <a:p>
+            <a:pPr indent="0">
+              <a:buNone/>
+            </a:pPr>
             <a:r>
               <a:rPr lang="en-US" dirty="0" smtClean="0"/>
-              <a:t>Google Visualization API</a:t>
-            </a:r>
-          </a:p>
-          <a:p>
+              <a:t>Is there a shared key in one field?  If not,  you must create it before you import the file.</a:t>
+            </a:r>
+          </a:p>
+          <a:p>
+            <a:pPr indent="0">
+              <a:buNone/>
+            </a:pPr>
             <a:r>
               <a:rPr lang="en-US" dirty="0" smtClean="0"/>
-              <a:t>Open Refine</a:t>
-            </a:r>
-          </a:p>
-          <a:p>
-            <a:r>
-              <a:rPr lang="en-US" dirty="0" smtClean="0"/>
-              <a:t>(</a:t>
-            </a:r>
-            <a:r>
-              <a:rPr lang="en-US" dirty="0" err="1" smtClean="0"/>
-              <a:t>Psst</a:t>
-            </a:r>
-            <a:r>
-              <a:rPr lang="en-US" dirty="0" smtClean="0"/>
-              <a:t>, the Google Maps API)</a:t>
+              <a:t/>
             </a:r>
             <a:br>
               <a:rPr lang="en-US" dirty="0" smtClean="0"/>
             </a:br>
-            <a:endParaRPr lang="en-US" dirty="0"/>
+            <a:r>
+              <a:rPr lang="en-US" dirty="0" smtClean="0"/>
+              <a:t>But be careful or Daniel Lathrop == </a:t>
+            </a:r>
+            <a:r>
+              <a:rPr lang="en-US" dirty="0" err="1" smtClean="0"/>
+              <a:t>Daniella</a:t>
+            </a:r>
+            <a:r>
+              <a:rPr lang="en-US" dirty="0" smtClean="0"/>
+              <a:t> </a:t>
+            </a:r>
+            <a:r>
+              <a:rPr lang="en-US" dirty="0" err="1" smtClean="0"/>
+              <a:t>Throp</a:t>
+            </a:r>
+            <a:endParaRPr lang="en-US" dirty="0" smtClean="0"/>
+          </a:p>
+          <a:p>
+            <a:pPr indent="0">
+              <a:buNone/>
+            </a:pPr>
+            <a:r>
+              <a:rPr lang="en-US" dirty="0" smtClean="0"/>
+              <a:t/>
+            </a:r>
+            <a:br>
+              <a:rPr lang="en-US" dirty="0" smtClean="0"/>
+            </a:br>
+            <a:r>
+              <a:rPr lang="en-US" dirty="0" smtClean="0"/>
+              <a:t>So use | (pipes) or  / or . or : or etc. (but never commas)</a:t>
+            </a:r>
           </a:p>
         </p:txBody>
       </p:sp>
@@ -4684,102 +4647,59 @@
       </p:grpSpPr>
       <p:sp>
         <p:nvSpPr>
-          <p:cNvPr id="2" name="Title 1"/>
-          <p:cNvSpPr>
-            <a:spLocks noGrp="1"/>
-          </p:cNvSpPr>
-          <p:nvPr>
-            <p:ph type="title"/>
-          </p:nvPr>
-        </p:nvSpPr>
-        <p:spPr/>
+          <p:cNvPr id="3" name="Content Placeholder 2"/>
+          <p:cNvSpPr>
+            <a:spLocks noGrp="1"/>
+          </p:cNvSpPr>
+          <p:nvPr>
+            <p:ph idx="1"/>
+          </p:nvPr>
+        </p:nvSpPr>
+        <p:spPr>
+          <a:xfrm>
+            <a:off x="457200" y="610241"/>
+            <a:ext cx="8229600" cy="5515922"/>
+          </a:xfrm>
+        </p:spPr>
         <p:txBody>
           <a:bodyPr/>
           <a:lstStyle/>
           <a:p>
-            <a:pPr algn="l"/>
+            <a:pPr indent="0">
+              <a:buNone/>
+            </a:pPr>
             <a:r>
               <a:rPr lang="en-US" dirty="0" smtClean="0"/>
-              <a:t>SQL API Magic…</a:t>
-            </a:r>
-            <a:endParaRPr lang="en-US" dirty="0"/>
-          </a:p>
-        </p:txBody>
-      </p:sp>
-      <p:sp>
-        <p:nvSpPr>
-          <p:cNvPr id="3" name="Content Placeholder 2"/>
-          <p:cNvSpPr>
-            <a:spLocks noGrp="1"/>
-          </p:cNvSpPr>
-          <p:nvPr>
-            <p:ph idx="1"/>
-          </p:nvPr>
-        </p:nvSpPr>
-        <p:spPr/>
-        <p:txBody>
-          <a:bodyPr/>
-          <a:lstStyle/>
-          <a:p>
+              <a:t>Suddenly you can find out who got money from whom, in your Web browser. More importantly, so can your colleagues.</a:t>
+            </a:r>
+          </a:p>
+          <a:p>
+            <a:pPr indent="0">
+              <a:buNone/>
+            </a:pPr>
+            <a:endParaRPr lang="en-US" dirty="0" smtClean="0"/>
+          </a:p>
+          <a:p>
+            <a:pPr indent="0">
+              <a:buNone/>
+            </a:pPr>
+            <a:r>
+              <a:rPr lang="en-US" strike="sngStrike" dirty="0" smtClean="0"/>
+              <a:t>SELECT * FROM INDV INNER JOIN CMTES ON CMTEID = CMTEID;</a:t>
+            </a:r>
+          </a:p>
+          <a:p>
+            <a:pPr indent="0">
+              <a:buNone/>
+            </a:pPr>
             <a:r>
               <a:rPr lang="en-US" dirty="0" smtClean="0"/>
-              <a:t>CSV</a:t>
-            </a:r>
-          </a:p>
-          <a:p>
-            <a:r>
+              <a:t/>
+            </a:r>
+            <a:br>
               <a:rPr lang="en-US" dirty="0" smtClean="0"/>
-              <a:t>JSON</a:t>
-            </a:r>
-          </a:p>
-          <a:p>
-            <a:r>
-              <a:rPr lang="en-US" dirty="0" smtClean="0"/>
-              <a:t>JSONP</a:t>
-            </a:r>
-          </a:p>
-        </p:txBody>
-      </p:sp>
-      <p:sp>
-        <p:nvSpPr>
-          <p:cNvPr id="4" name="Title 1"/>
-          <p:cNvSpPr txBox="1">
-            <a:spLocks/>
-          </p:cNvSpPr>
-          <p:nvPr/>
-        </p:nvSpPr>
-        <p:spPr bwMode="auto">
-          <a:xfrm>
-            <a:off x="0" y="4403634"/>
-            <a:ext cx="9132145" cy="1143000"/>
-          </a:xfrm>
-          <a:prstGeom prst="rect">
-            <a:avLst/>
-          </a:prstGeom>
-          <a:noFill/>
-          <a:ln w="9525">
-            <a:noFill/>
-            <a:miter lim="800000"/>
-            <a:headEnd/>
-            <a:tailEnd/>
-          </a:ln>
-        </p:spPr>
-        <p:txBody>
-          <a:bodyPr vert="horz" wrap="square" lIns="91440" tIns="45720" rIns="91440" bIns="45720" numCol="1" anchor="ctr" anchorCtr="0" compatLnSpc="1">
-            <a:prstTxWarp prst="textNoShape">
-              <a:avLst/>
-            </a:prstTxWarp>
-          </a:bodyPr>
-          <a:lstStyle/>
-          <a:p>
-            <a:pPr lvl="0" algn="ctr"/>
-            <a:r>
-              <a:rPr lang="en-US" sz="2400" b="1" dirty="0" smtClean="0">
-                <a:latin typeface="Futura Condensed"/>
-                <a:cs typeface="Futura Condensed"/>
-              </a:rPr>
-              <a:t>developers.google.com/fusiontables/docs/v1/sql-reference</a:t>
-            </a:r>
+            </a:br>
+            <a:endParaRPr lang="en-US" dirty="0" smtClean="0"/>
           </a:p>
         </p:txBody>
       </p:sp>
@@ -4826,6 +4746,227 @@
             <a:pPr algn="l"/>
             <a:r>
               <a:rPr lang="en-US" dirty="0" smtClean="0"/>
+              <a:t>Use it with other Google tools</a:t>
+            </a:r>
+            <a:endParaRPr lang="en-US" dirty="0"/>
+          </a:p>
+        </p:txBody>
+      </p:sp>
+      <p:sp>
+        <p:nvSpPr>
+          <p:cNvPr id="4" name="Content Placeholder 3"/>
+          <p:cNvSpPr>
+            <a:spLocks noGrp="1"/>
+          </p:cNvSpPr>
+          <p:nvPr>
+            <p:ph idx="1"/>
+          </p:nvPr>
+        </p:nvSpPr>
+        <p:spPr/>
+        <p:txBody>
+          <a:bodyPr/>
+          <a:lstStyle/>
+          <a:p>
+            <a:r>
+              <a:rPr lang="en-US" dirty="0" smtClean="0"/>
+              <a:t>Google Visualization API</a:t>
+            </a:r>
+          </a:p>
+          <a:p>
+            <a:r>
+              <a:rPr lang="en-US" dirty="0" smtClean="0"/>
+              <a:t>Open Refine</a:t>
+            </a:r>
+          </a:p>
+          <a:p>
+            <a:r>
+              <a:rPr lang="en-US" dirty="0" smtClean="0"/>
+              <a:t>(</a:t>
+            </a:r>
+            <a:r>
+              <a:rPr lang="en-US" dirty="0" err="1" smtClean="0"/>
+              <a:t>Psst</a:t>
+            </a:r>
+            <a:r>
+              <a:rPr lang="en-US" dirty="0" smtClean="0"/>
+              <a:t>, the Google Maps API)</a:t>
+            </a:r>
+            <a:br>
+              <a:rPr lang="en-US" dirty="0" smtClean="0"/>
+            </a:br>
+            <a:endParaRPr lang="en-US" dirty="0"/>
+          </a:p>
+        </p:txBody>
+      </p:sp>
+    </p:spTree>
+  </p:cSld>
+  <p:clrMapOvr>
+    <a:masterClrMapping/>
+  </p:clrMapOvr>
+</p:sld>
+</file>
+
+<file path=ppt/slides/slide15.xml><?xml version="1.0" encoding="utf-8"?>
+<p:sld xmlns:a="http://schemas.openxmlformats.org/drawingml/2006/main" xmlns:r="http://schemas.openxmlformats.org/officeDocument/2006/relationships" xmlns:mc="http://schemas.openxmlformats.org/markup-compatibility/2006" xmlns:mv="urn:schemas-microsoft-com:mac:vml" xmlns:p="http://schemas.openxmlformats.org/presentationml/2006/main" mc:Ignorable="mv" mc:PreserveAttributes="mv:*">
+  <p:cSld>
+    <p:spTree>
+      <p:nvGrpSpPr>
+        <p:cNvPr id="1" name=""/>
+        <p:cNvGrpSpPr/>
+        <p:nvPr/>
+      </p:nvGrpSpPr>
+      <p:grpSpPr>
+        <a:xfrm>
+          <a:off x="0" y="0"/>
+          <a:ext cx="0" cy="0"/>
+          <a:chOff x="0" y="0"/>
+          <a:chExt cx="0" cy="0"/>
+        </a:xfrm>
+      </p:grpSpPr>
+      <p:sp>
+        <p:nvSpPr>
+          <p:cNvPr id="2" name="Title 1"/>
+          <p:cNvSpPr>
+            <a:spLocks noGrp="1"/>
+          </p:cNvSpPr>
+          <p:nvPr>
+            <p:ph type="title"/>
+          </p:nvPr>
+        </p:nvSpPr>
+        <p:spPr/>
+        <p:txBody>
+          <a:bodyPr/>
+          <a:lstStyle/>
+          <a:p>
+            <a:pPr algn="l"/>
+            <a:r>
+              <a:rPr lang="en-US" dirty="0" smtClean="0"/>
+              <a:t>SQL API Magic…</a:t>
+            </a:r>
+            <a:endParaRPr lang="en-US" dirty="0"/>
+          </a:p>
+        </p:txBody>
+      </p:sp>
+      <p:sp>
+        <p:nvSpPr>
+          <p:cNvPr id="3" name="Content Placeholder 2"/>
+          <p:cNvSpPr>
+            <a:spLocks noGrp="1"/>
+          </p:cNvSpPr>
+          <p:nvPr>
+            <p:ph idx="1"/>
+          </p:nvPr>
+        </p:nvSpPr>
+        <p:spPr/>
+        <p:txBody>
+          <a:bodyPr/>
+          <a:lstStyle/>
+          <a:p>
+            <a:r>
+              <a:rPr lang="en-US" dirty="0" smtClean="0"/>
+              <a:t>CSV</a:t>
+            </a:r>
+          </a:p>
+          <a:p>
+            <a:r>
+              <a:rPr lang="en-US" dirty="0" smtClean="0"/>
+              <a:t>JSON</a:t>
+            </a:r>
+          </a:p>
+          <a:p>
+            <a:r>
+              <a:rPr lang="en-US" dirty="0" smtClean="0"/>
+              <a:t>JSONP</a:t>
+            </a:r>
+          </a:p>
+        </p:txBody>
+      </p:sp>
+      <p:sp>
+        <p:nvSpPr>
+          <p:cNvPr id="4" name="Title 1"/>
+          <p:cNvSpPr txBox="1">
+            <a:spLocks/>
+          </p:cNvSpPr>
+          <p:nvPr/>
+        </p:nvSpPr>
+        <p:spPr bwMode="auto">
+          <a:xfrm>
+            <a:off x="0" y="4403634"/>
+            <a:ext cx="9132145" cy="1143000"/>
+          </a:xfrm>
+          <a:prstGeom prst="rect">
+            <a:avLst/>
+          </a:prstGeom>
+          <a:noFill/>
+          <a:ln w="9525">
+            <a:noFill/>
+            <a:miter lim="800000"/>
+            <a:headEnd/>
+            <a:tailEnd/>
+          </a:ln>
+        </p:spPr>
+        <p:txBody>
+          <a:bodyPr vert="horz" wrap="square" lIns="91440" tIns="45720" rIns="91440" bIns="45720" numCol="1" anchor="ctr" anchorCtr="0" compatLnSpc="1">
+            <a:prstTxWarp prst="textNoShape">
+              <a:avLst/>
+            </a:prstTxWarp>
+          </a:bodyPr>
+          <a:lstStyle/>
+          <a:p>
+            <a:pPr lvl="0" algn="ctr"/>
+            <a:r>
+              <a:rPr lang="en-US" sz="2400" b="1" dirty="0" smtClean="0">
+                <a:latin typeface="Futura Condensed"/>
+                <a:cs typeface="Futura Condensed"/>
+              </a:rPr>
+              <a:t>developers.google.com/fusiontables/docs/v1/sql-reference</a:t>
+            </a:r>
+          </a:p>
+        </p:txBody>
+      </p:sp>
+    </p:spTree>
+  </p:cSld>
+  <p:clrMapOvr>
+    <a:masterClrMapping/>
+  </p:clrMapOvr>
+</p:sld>
+</file>
+
+<file path=ppt/slides/slide16.xml><?xml version="1.0" encoding="utf-8"?>
+<p:sld xmlns:a="http://schemas.openxmlformats.org/drawingml/2006/main" xmlns:r="http://schemas.openxmlformats.org/officeDocument/2006/relationships" xmlns:mc="http://schemas.openxmlformats.org/markup-compatibility/2006" xmlns:mv="urn:schemas-microsoft-com:mac:vml" xmlns:p="http://schemas.openxmlformats.org/presentationml/2006/main" mc:Ignorable="mv" mc:PreserveAttributes="mv:*">
+  <p:cSld>
+    <p:spTree>
+      <p:nvGrpSpPr>
+        <p:cNvPr id="1" name=""/>
+        <p:cNvGrpSpPr/>
+        <p:nvPr/>
+      </p:nvGrpSpPr>
+      <p:grpSpPr>
+        <a:xfrm>
+          <a:off x="0" y="0"/>
+          <a:ext cx="0" cy="0"/>
+          <a:chOff x="0" y="0"/>
+          <a:chExt cx="0" cy="0"/>
+        </a:xfrm>
+      </p:grpSpPr>
+      <p:sp>
+        <p:nvSpPr>
+          <p:cNvPr id="2" name="Title 1"/>
+          <p:cNvSpPr>
+            <a:spLocks noGrp="1"/>
+          </p:cNvSpPr>
+          <p:nvPr>
+            <p:ph type="title"/>
+          </p:nvPr>
+        </p:nvSpPr>
+        <p:spPr/>
+        <p:txBody>
+          <a:bodyPr/>
+          <a:lstStyle/>
+          <a:p>
+            <a:pPr algn="l"/>
+            <a:r>
+              <a:rPr lang="en-US" dirty="0" smtClean="0"/>
               <a:t>Speaking of APIs, can I get me a searchable database?</a:t>
             </a:r>
             <a:endParaRPr lang="en-US" dirty="0"/>
@@ -4909,7 +5050,7 @@
 </p:sld>
 </file>
 
-<file path=ppt/slides/slide15.xml><?xml version="1.0" encoding="utf-8"?>
+<file path=ppt/slides/slide17.xml><?xml version="1.0" encoding="utf-8"?>
 <p:sld xmlns:a="http://schemas.openxmlformats.org/drawingml/2006/main" xmlns:r="http://schemas.openxmlformats.org/officeDocument/2006/relationships" xmlns:mc="http://schemas.openxmlformats.org/markup-compatibility/2006" xmlns:mv="urn:schemas-microsoft-com:mac:vml" xmlns:p="http://schemas.openxmlformats.org/presentationml/2006/main" mc:Ignorable="mv" mc:PreserveAttributes="mv:*">
   <p:cSld>
     <p:spTree>
@@ -5646,7 +5787,7 @@
 </file>
 
 <file path=ppt/slides/slide9.xml><?xml version="1.0" encoding="utf-8"?>
-<p:sld xmlns:a="http://schemas.openxmlformats.org/drawingml/2006/main" xmlns:r="http://schemas.openxmlformats.org/officeDocument/2006/relationships" xmlns:mc="http://schemas.openxmlformats.org/markup-compatibility/2006" xmlns:mv="urn:schemas-microsoft-com:mac:vml" xmlns:p="http://schemas.openxmlformats.org/presentationml/2006/main" mc:Ignorable="mv" mc:PreserveAttributes="mv:*" show="0">
+<p:sld xmlns:a="http://schemas.openxmlformats.org/drawingml/2006/main" xmlns:r="http://schemas.openxmlformats.org/officeDocument/2006/relationships" xmlns:mc="http://schemas.openxmlformats.org/markup-compatibility/2006" xmlns:mv="urn:schemas-microsoft-com:mac:vml" xmlns:p="http://schemas.openxmlformats.org/presentationml/2006/main" mc:Ignorable="mv" mc:PreserveAttributes="mv:*">
   <p:cSld>
     <p:spTree>
       <p:nvGrpSpPr>
@@ -5686,28 +5827,27 @@
           </a:p>
         </p:txBody>
       </p:sp>
-      <p:sp>
-        <p:nvSpPr>
-          <p:cNvPr id="3" name="Content Placeholder 2"/>
-          <p:cNvSpPr>
-            <a:spLocks noGrp="1"/>
-          </p:cNvSpPr>
+      <p:pic>
+        <p:nvPicPr>
+          <p:cNvPr id="4" name="Content Placeholder 3" descr="Screen shot 2013-03-02 at 8.40.08 AM.png">
+            <a:hlinkClick r:id="rId2"/>
+          </p:cNvPr>
+          <p:cNvPicPr>
+            <a:picLocks noGrp="1" noChangeAspect="1"/>
+          </p:cNvPicPr>
           <p:nvPr>
             <p:ph idx="1"/>
           </p:nvPr>
-        </p:nvSpPr>
+        </p:nvPicPr>
+        <p:blipFill>
+          <a:blip r:embed="rId3"/>
+          <a:srcRect l="-17366" r="-17366"/>
+          <a:stretch>
+            <a:fillRect/>
+          </a:stretch>
+        </p:blipFill>
         <p:spPr/>
-        <p:txBody>
-          <a:bodyPr/>
-          <a:lstStyle/>
-          <a:p>
-            <a:pPr indent="0">
-              <a:buNone/>
-            </a:pPr>
-            <a:endParaRPr lang="en-US" dirty="0" smtClean="0"/>
-          </a:p>
-        </p:txBody>
-      </p:sp>
+      </p:pic>
     </p:spTree>
   </p:cSld>
   <p:clrMapOvr>

</xml_diff>